<commit_message>
I think we're done here! :)
</commit_message>
<xml_diff>
--- a/Documents/Lingua Ad Hoc.pptx
+++ b/Documents/Lingua Ad Hoc.pptx
@@ -104,6 +104,22 @@
       </a:defRPr>
     </a:lvl9pPr>
   </p:defaultTextStyle>
+  <p:extLst>
+    <p:ext uri="{EFAFB233-063F-42B5-8137-9DF3F51BA10A}">
+      <p15:sldGuideLst xmlns:p15="http://schemas.microsoft.com/office/powerpoint/2012/main">
+        <p15:guide id="1" orient="horz" pos="2160">
+          <p15:clr>
+            <a:srgbClr val="A4A3A4"/>
+          </p15:clr>
+        </p15:guide>
+        <p15:guide id="2" pos="2880">
+          <p15:clr>
+            <a:srgbClr val="A4A3A4"/>
+          </p15:clr>
+        </p15:guide>
+      </p15:sldGuideLst>
+    </p:ext>
+  </p:extLst>
 </p:presentation>
 </file>
 
@@ -3198,9 +3214,6 @@
               </a:rPr>
               <a:t>!</a:t>
             </a:r>
-            <a:endParaRPr lang="de-CH" sz="4400" dirty="0" smtClean="0">
-              <a:latin typeface="Freestyle Script" pitchFamily="66" charset="0"/>
-            </a:endParaRPr>
           </a:p>
         </p:txBody>
       </p:sp>

</xml_diff>